<commit_message>
Updated Poster for final Symposium
</commit_message>
<xml_diff>
--- a/Documentation/Schrum Poster FRF Data Bridge.pptx
+++ b/Documentation/Schrum Poster FRF Data Bridge.pptx
@@ -243,7 +243,7 @@
           <a:p>
             <a:fld id="{777276F7-4A50-40EE-A883-EB5FC41F7C9D}" type="datetimeFigureOut">
               <a:rPr lang="en-US" smtClean="0"/>
-              <a:t>3/30/2018</a:t>
+              <a:t>5/3/2018</a:t>
             </a:fld>
             <a:endParaRPr lang="en-US"/>
           </a:p>
@@ -413,7 +413,7 @@
           <a:p>
             <a:fld id="{777276F7-4A50-40EE-A883-EB5FC41F7C9D}" type="datetimeFigureOut">
               <a:rPr lang="en-US" smtClean="0"/>
-              <a:t>3/30/2018</a:t>
+              <a:t>5/3/2018</a:t>
             </a:fld>
             <a:endParaRPr lang="en-US"/>
           </a:p>
@@ -593,7 +593,7 @@
           <a:p>
             <a:fld id="{777276F7-4A50-40EE-A883-EB5FC41F7C9D}" type="datetimeFigureOut">
               <a:rPr lang="en-US" smtClean="0"/>
-              <a:t>3/30/2018</a:t>
+              <a:t>5/3/2018</a:t>
             </a:fld>
             <a:endParaRPr lang="en-US"/>
           </a:p>
@@ -763,7 +763,7 @@
           <a:p>
             <a:fld id="{777276F7-4A50-40EE-A883-EB5FC41F7C9D}" type="datetimeFigureOut">
               <a:rPr lang="en-US" smtClean="0"/>
-              <a:t>3/30/2018</a:t>
+              <a:t>5/3/2018</a:t>
             </a:fld>
             <a:endParaRPr lang="en-US"/>
           </a:p>
@@ -1007,7 +1007,7 @@
           <a:p>
             <a:fld id="{777276F7-4A50-40EE-A883-EB5FC41F7C9D}" type="datetimeFigureOut">
               <a:rPr lang="en-US" smtClean="0"/>
-              <a:t>3/30/2018</a:t>
+              <a:t>5/3/2018</a:t>
             </a:fld>
             <a:endParaRPr lang="en-US"/>
           </a:p>
@@ -1239,7 +1239,7 @@
           <a:p>
             <a:fld id="{777276F7-4A50-40EE-A883-EB5FC41F7C9D}" type="datetimeFigureOut">
               <a:rPr lang="en-US" smtClean="0"/>
-              <a:t>3/30/2018</a:t>
+              <a:t>5/3/2018</a:t>
             </a:fld>
             <a:endParaRPr lang="en-US"/>
           </a:p>
@@ -1606,7 +1606,7 @@
           <a:p>
             <a:fld id="{777276F7-4A50-40EE-A883-EB5FC41F7C9D}" type="datetimeFigureOut">
               <a:rPr lang="en-US" smtClean="0"/>
-              <a:t>3/30/2018</a:t>
+              <a:t>5/3/2018</a:t>
             </a:fld>
             <a:endParaRPr lang="en-US"/>
           </a:p>
@@ -1724,7 +1724,7 @@
           <a:p>
             <a:fld id="{777276F7-4A50-40EE-A883-EB5FC41F7C9D}" type="datetimeFigureOut">
               <a:rPr lang="en-US" smtClean="0"/>
-              <a:t>3/30/2018</a:t>
+              <a:t>5/3/2018</a:t>
             </a:fld>
             <a:endParaRPr lang="en-US"/>
           </a:p>
@@ -1819,7 +1819,7 @@
           <a:p>
             <a:fld id="{777276F7-4A50-40EE-A883-EB5FC41F7C9D}" type="datetimeFigureOut">
               <a:rPr lang="en-US" smtClean="0"/>
-              <a:t>3/30/2018</a:t>
+              <a:t>5/3/2018</a:t>
             </a:fld>
             <a:endParaRPr lang="en-US"/>
           </a:p>
@@ -2096,7 +2096,7 @@
           <a:p>
             <a:fld id="{777276F7-4A50-40EE-A883-EB5FC41F7C9D}" type="datetimeFigureOut">
               <a:rPr lang="en-US" smtClean="0"/>
-              <a:t>3/30/2018</a:t>
+              <a:t>5/3/2018</a:t>
             </a:fld>
             <a:endParaRPr lang="en-US"/>
           </a:p>
@@ -2353,7 +2353,7 @@
           <a:p>
             <a:fld id="{777276F7-4A50-40EE-A883-EB5FC41F7C9D}" type="datetimeFigureOut">
               <a:rPr lang="en-US" smtClean="0"/>
-              <a:t>3/30/2018</a:t>
+              <a:t>5/3/2018</a:t>
             </a:fld>
             <a:endParaRPr lang="en-US"/>
           </a:p>
@@ -2566,7 +2566,7 @@
           <a:p>
             <a:fld id="{777276F7-4A50-40EE-A883-EB5FC41F7C9D}" type="datetimeFigureOut">
               <a:rPr lang="en-US" smtClean="0"/>
-              <a:t>3/30/2018</a:t>
+              <a:t>5/3/2018</a:t>
             </a:fld>
             <a:endParaRPr lang="en-US"/>
           </a:p>
@@ -3114,7 +3114,7 @@
           <a:p>
             <a:r>
               <a:rPr lang="en-US" sz="3600" dirty="0"/>
-              <a:t>The US Army Corps of Engineers' Field Research Facility in Duck, North Carolina (FRF), maintains multiple sensor stations in the Atlantic Ocean and the Currituck Sound. To keep track of important information about these sensors, FRF maintains a database with all essential information about stations, sensors, and service times in a MongoDB database.</a:t>
+              <a:t>The US Army Corps of Engineers' Field Research Facility in Duck, North Carolina (FRF), maintains multiple sensor stations at various locations in the Atlantic Ocean. To keep track of important information about these sensors, FRF maintains a database with all essential information about stations, sensors, and service times in a MongoDB database.</a:t>
             </a:r>
           </a:p>
         </p:txBody>
@@ -3181,23 +3181,7 @@
           <a:p>
             <a:r>
               <a:rPr lang="en-US" sz="3600" dirty="0"/>
-              <a:t>To provide FRF personnel with the ability to query their data using SQL, the data must be stored in a Relational Database Management System (RDBMS) such as </a:t>
-            </a:r>
-            <a:r>
-              <a:rPr lang="en-US" sz="3600" dirty="0" err="1"/>
-              <a:t>PostGres</a:t>
-            </a:r>
-            <a:r>
-              <a:rPr lang="en-US" sz="3600" dirty="0"/>
-              <a:t>. To accomplish this, the data must be migrated from MongoDB to a </a:t>
-            </a:r>
-            <a:r>
-              <a:rPr lang="en-US" sz="3600" dirty="0" err="1"/>
-              <a:t>PostGres</a:t>
-            </a:r>
-            <a:r>
-              <a:rPr lang="en-US" sz="3600" dirty="0"/>
-              <a:t> RDBMS.  This project accomplishes this migration.</a:t>
+              <a:t>To provide FRF personnel with the ability to query their data using SQL, the data must be stored in a Relational Database Management System (RDBMS) such as PostgreSQL. To accomplish this, the data must be migrated from MongoDB to a PostgreSQL RDBMS.  This project accomplishes this migration.</a:t>
             </a:r>
           </a:p>
           <a:p>
@@ -3212,15 +3196,7 @@
           <a:p>
             <a:r>
               <a:rPr lang="en-US" sz="3600" dirty="0"/>
-              <a:t>Migrating the data from MongoDB to </a:t>
-            </a:r>
-            <a:r>
-              <a:rPr lang="en-US" sz="3600" dirty="0" err="1"/>
-              <a:t>PostGres</a:t>
-            </a:r>
-            <a:r>
-              <a:rPr lang="en-US" sz="3600" dirty="0"/>
-              <a:t> is a challenging process because the data configuration of a Document Database is fundamentally different from the "data shape" of a RDBMS. The first challenge was to analyze the data exported from MongoDB and determine what should be the appropriate Entity Relation Diagram for the RDBMS.</a:t>
+              <a:t>Migrating the data from MongoDB to PostgreSQL is a challenging process because the data configuration of a Document Database is fundamentally different from the "data shape" of a RDBMS. The first challenge was to analyze the data exported from MongoDB and determine what should be the appropriate Entity Relation Diagram for the RDBMS.</a:t>
             </a:r>
           </a:p>
         </p:txBody>
@@ -3284,63 +3260,55 @@
           <a:p>
             <a:r>
               <a:rPr lang="en-US" sz="3600" dirty="0"/>
-              <a:t>The second step was to implement the bridge, which is Python code using arcpy to read the text file, parse the data, and write the values to the </a:t>
-            </a:r>
-            <a:r>
-              <a:rPr lang="en-US" sz="3600" dirty="0" err="1"/>
-              <a:t>PostGres</a:t>
-            </a:r>
+              <a:t>The second step was to implement the bridge, which is Python code using arcpy to read the text file, parse the data, and write the values to the PostgreSQL database such that it fits the ER Diagram, including storing of the spatial coordinates so that the points may displayed on a web map.</a:t>
+            </a:r>
+          </a:p>
+          <a:p>
+            <a:endParaRPr lang="en-US" sz="3600" dirty="0"/>
+          </a:p>
+          <a:p>
+            <a:endParaRPr lang="en-US" sz="3600" dirty="0"/>
+          </a:p>
+          <a:p>
+            <a:endParaRPr lang="en-US" sz="3600" dirty="0"/>
+          </a:p>
+          <a:p>
+            <a:endParaRPr lang="en-US" sz="3600" dirty="0"/>
+          </a:p>
+          <a:p>
+            <a:endParaRPr lang="en-US" sz="3600" dirty="0"/>
+          </a:p>
+          <a:p>
+            <a:endParaRPr lang="en-US" sz="3600" dirty="0"/>
+          </a:p>
+          <a:p>
+            <a:endParaRPr lang="en-US" sz="3600" dirty="0"/>
+          </a:p>
+          <a:p>
+            <a:endParaRPr lang="en-US" sz="3600" dirty="0"/>
+          </a:p>
+          <a:p>
+            <a:endParaRPr lang="en-US" sz="3600" dirty="0"/>
+          </a:p>
+          <a:p>
+            <a:endParaRPr lang="en-US" sz="3600" dirty="0"/>
+          </a:p>
+          <a:p>
+            <a:endParaRPr lang="en-US" sz="3600" dirty="0"/>
+          </a:p>
+          <a:p>
+            <a:endParaRPr lang="en-US" sz="3600" dirty="0"/>
+          </a:p>
+          <a:p>
+            <a:endParaRPr lang="en-US" sz="3600" dirty="0"/>
+          </a:p>
+          <a:p>
+            <a:endParaRPr lang="en-US" sz="3600" dirty="0"/>
+          </a:p>
+          <a:p>
             <a:r>
               <a:rPr lang="en-US" sz="3600" dirty="0"/>
-              <a:t> database such that it fits the ER Diagram, including storing of the spatial coordinates so that the points may displayed on a web map.</a:t>
-            </a:r>
-          </a:p>
-          <a:p>
-            <a:endParaRPr lang="en-US" sz="3600" dirty="0"/>
-          </a:p>
-          <a:p>
-            <a:endParaRPr lang="en-US" sz="3600" dirty="0"/>
-          </a:p>
-          <a:p>
-            <a:endParaRPr lang="en-US" sz="3600" dirty="0"/>
-          </a:p>
-          <a:p>
-            <a:endParaRPr lang="en-US" sz="3600" dirty="0"/>
-          </a:p>
-          <a:p>
-            <a:endParaRPr lang="en-US" sz="3600" dirty="0"/>
-          </a:p>
-          <a:p>
-            <a:endParaRPr lang="en-US" sz="3600" dirty="0"/>
-          </a:p>
-          <a:p>
-            <a:endParaRPr lang="en-US" sz="3600" dirty="0"/>
-          </a:p>
-          <a:p>
-            <a:endParaRPr lang="en-US" sz="3600" dirty="0"/>
-          </a:p>
-          <a:p>
-            <a:endParaRPr lang="en-US" sz="3600" dirty="0"/>
-          </a:p>
-          <a:p>
-            <a:endParaRPr lang="en-US" sz="3600" dirty="0"/>
-          </a:p>
-          <a:p>
-            <a:endParaRPr lang="en-US" sz="3600" dirty="0"/>
-          </a:p>
-          <a:p>
-            <a:endParaRPr lang="en-US" sz="3600" dirty="0"/>
-          </a:p>
-          <a:p>
-            <a:endParaRPr lang="en-US" sz="3600" dirty="0"/>
-          </a:p>
-          <a:p>
-            <a:endParaRPr lang="en-US" sz="3600" dirty="0"/>
-          </a:p>
-          <a:p>
-            <a:r>
-              <a:rPr lang="en-US" sz="3600" dirty="0"/>
-              <a:t>The third step is to implement the bridge in Python code. This module will read the MongoDB data dump, convert it to SQL, and update the three tables (see Diagram 1) as needed.</a:t>
+              <a:t>The third step is to implement the bridge in Python code. The Python module reads the MongoDB data dump, convert it to SQL, and update the three tables (see Diagram 1) as needed.</a:t>
             </a:r>
           </a:p>
           <a:p>
@@ -3404,35 +3372,34 @@
           <a:p>
             <a:r>
               <a:rPr lang="en-US" sz="3600" dirty="0"/>
-              <a:t>Results have yet to be determined. The Python code and the web maps are still under development as of 3/30/2018.</a:t>
+              <a:t>Using ESRI's arcpy module, Python code was developed which reads the .json input files then writes those values to the PostgreSQL database by using an </a:t>
+            </a:r>
+            <a:r>
+              <a:rPr lang="en-US" sz="3600" dirty="0" err="1"/>
+              <a:t>InsertCursor</a:t>
+            </a:r>
+            <a:r>
+              <a:rPr lang="en-US" sz="3600" dirty="0"/>
+              <a:t> on the map. Whenever FRF personnel need to update wishes to update the PostgreSQL database, all that is necessary is to run a command at a standard windows Command Line prompt.</a:t>
             </a:r>
           </a:p>
           <a:p>
             <a:endParaRPr lang="en-US" sz="3600" dirty="0"/>
           </a:p>
           <a:p>
+            <a:r>
+              <a:rPr lang="en-US" sz="3600" dirty="0"/>
+              <a:t>Once the data has been bridged to populate the PostgreSQL database, the public may view the stations and gages on a Web Map and download the data as CSV files via a Web App.</a:t>
+            </a:r>
+          </a:p>
+          <a:p>
             <a:endParaRPr lang="en-US" sz="3600" dirty="0"/>
           </a:p>
           <a:p>
-            <a:endParaRPr lang="en-US" sz="3600" dirty="0"/>
-          </a:p>
-          <a:p>
-            <a:endParaRPr lang="en-US" sz="3600" dirty="0"/>
-          </a:p>
-          <a:p>
-            <a:endParaRPr lang="en-US" sz="3600" dirty="0"/>
-          </a:p>
-          <a:p>
-            <a:endParaRPr lang="en-US" sz="3600" dirty="0"/>
-          </a:p>
-          <a:p>
-            <a:endParaRPr lang="en-US" sz="3600" dirty="0"/>
-          </a:p>
-          <a:p>
-            <a:endParaRPr lang="en-US" sz="3600" dirty="0"/>
-          </a:p>
-          <a:p>
-            <a:endParaRPr lang="en-US" sz="3600" dirty="0"/>
+            <a:r>
+              <a:rPr lang="en-US" sz="3600" dirty="0"/>
+              <a:t>A screenshot of the Web App is shown in Figure 2.</a:t>
+            </a:r>
           </a:p>
           <a:p>
             <a:endParaRPr lang="en-US" sz="3600" dirty="0"/>
@@ -3453,8 +3420,8 @@
         </p:nvSpPr>
         <p:spPr>
           <a:xfrm>
-            <a:off x="30372873" y="21368154"/>
-            <a:ext cx="12436496" cy="5078313"/>
+            <a:off x="30372873" y="18390497"/>
+            <a:ext cx="12436496" cy="6740307"/>
           </a:xfrm>
           <a:prstGeom prst="rect">
             <a:avLst/>
@@ -3489,7 +3456,7 @@
           <a:p>
             <a:r>
               <a:rPr lang="en-US" sz="3600" dirty="0"/>
-              <a:t>Discussion Section goes here.</a:t>
+              <a:t>This project is primarily a software development project with Web Mapping and Web Application capabilities added on after the software was developed.</a:t>
             </a:r>
           </a:p>
           <a:p>
@@ -3498,22 +3465,17 @@
           <a:p>
             <a:r>
               <a:rPr lang="en-US" sz="3600" dirty="0"/>
-              <a:t>Future work will include adding the sensor reading data to </a:t>
-            </a:r>
-            <a:r>
-              <a:rPr lang="en-US" sz="3600"/>
-              <a:t>the database.</a:t>
-            </a:r>
+              <a:t>The Python module was developed with two objectives in mind: 1) Ease of operational use – the system administrator's task is as simple as possible, and</a:t>
+            </a:r>
+          </a:p>
+          <a:p>
             <a:endParaRPr lang="en-US" sz="3600" dirty="0"/>
           </a:p>
           <a:p>
-            <a:endParaRPr lang="en-US" sz="3600" dirty="0"/>
-          </a:p>
-          <a:p>
-            <a:endParaRPr lang="en-US" sz="3600" dirty="0"/>
-          </a:p>
-          <a:p>
-            <a:endParaRPr lang="en-US" sz="3600" dirty="0"/>
+            <a:r>
+              <a:rPr lang="en-US" sz="3600" dirty="0"/>
+              <a:t>2) Ease of extending capabilities – FRF staff who know some Python may extend capabilities easily.</a:t>
+            </a:r>
           </a:p>
         </p:txBody>
       </p:sp>
@@ -3531,7 +3493,7 @@
         </p:nvSpPr>
         <p:spPr>
           <a:xfrm>
-            <a:off x="30372873" y="26519023"/>
+            <a:off x="30372873" y="25628070"/>
             <a:ext cx="12494391" cy="2862322"/>
           </a:xfrm>
           <a:prstGeom prst="rect">
@@ -3567,17 +3529,8 @@
           <a:p>
             <a:r>
               <a:rPr lang="en-US" sz="3600" dirty="0"/>
-              <a:t>That's, that's, that's,</a:t>
-            </a:r>
-          </a:p>
-          <a:p>
-            <a:r>
-              <a:rPr lang="en-US" sz="3600" dirty="0"/>
-              <a:t>That's all folks.</a:t>
-            </a:r>
-          </a:p>
-          <a:p>
-            <a:endParaRPr lang="en-US" sz="3600" dirty="0"/>
+              <a:t>The primary objectives were met and the bridge works satisfactorily. In future work FRF personnel may add other tables to this system, including making the gage readings available.</a:t>
+            </a:r>
           </a:p>
         </p:txBody>
       </p:sp>
@@ -3595,8 +3548,8 @@
         </p:nvSpPr>
         <p:spPr>
           <a:xfrm>
-            <a:off x="30462924" y="29718711"/>
-            <a:ext cx="12346445" cy="2862322"/>
+            <a:off x="30462924" y="28851206"/>
+            <a:ext cx="12346445" cy="3416320"/>
           </a:xfrm>
           <a:prstGeom prst="rect">
             <a:avLst/>
@@ -3631,7 +3584,7 @@
           <a:p>
             <a:r>
               <a:rPr lang="en-US" sz="3600" dirty="0"/>
-              <a:t>Thanks to the Field Research Facility staff for their assistance with this project.  All photographs are provided by the Field Research Facility except for the background image, which is public domain.</a:t>
+              <a:t>Thanks to the Field Research Facility staff for their assistance with this project.  Figure 1 is provided by the Field Research Facility. The background image is from Wikipedia and is in the public domain.</a:t>
             </a:r>
           </a:p>
         </p:txBody>
@@ -3678,13 +3631,8 @@
             <a:pPr algn="ctr"/>
             <a:r>
               <a:rPr lang="en-US" sz="13600" dirty="0"/>
-              <a:t>Bridging MongoDB to </a:t>
-            </a:r>
-            <a:r>
-              <a:rPr lang="en-US" sz="13600" dirty="0" err="1"/>
-              <a:t>PostGres</a:t>
-            </a:r>
-            <a:endParaRPr lang="en-US" sz="13600" dirty="0"/>
+              <a:t>Bridging MongoDB to PostgreSQL</a:t>
+            </a:r>
           </a:p>
           <a:p>
             <a:pPr algn="ctr"/>
@@ -3707,744 +3655,49 @@
             </a:r>
             <a:r>
               <a:rPr lang="en-US" sz="6000" dirty="0"/>
-              <a:t>			30 March 2018</a:t>
-            </a:r>
-          </a:p>
-        </p:txBody>
-      </p:sp>
-      <p:grpSp>
-        <p:nvGrpSpPr>
-          <p:cNvPr id="36" name="Group 35">
+              <a:t>			11 May 2018</a:t>
+            </a:r>
+          </a:p>
+        </p:txBody>
+      </p:sp>
+      <p:sp>
+        <p:nvSpPr>
+          <p:cNvPr id="34" name="TextBox 33">
             <a:extLst>
               <a:ext uri="{FF2B5EF4-FFF2-40B4-BE49-F238E27FC236}">
-                <a16:creationId xmlns:a16="http://schemas.microsoft.com/office/drawing/2014/main" id="{9C6EACC6-759A-42B0-9607-F49E537BCB7F}"/>
+                <a16:creationId xmlns:a16="http://schemas.microsoft.com/office/drawing/2014/main" id="{F5BA52F6-4509-4B99-A0EB-28451D46D307}"/>
               </a:ext>
             </a:extLst>
           </p:cNvPr>
-          <p:cNvGrpSpPr/>
+          <p:cNvSpPr txBox="1"/>
           <p:nvPr/>
-        </p:nvGrpSpPr>
-        <p:grpSpPr>
+        </p:nvSpPr>
+        <p:spPr>
           <a:xfrm>
-            <a:off x="15048396" y="12039900"/>
-            <a:ext cx="14493758" cy="6453939"/>
-            <a:chOff x="15048396" y="12039900"/>
-            <a:chExt cx="14493758" cy="6453939"/>
+            <a:off x="15048396" y="17293510"/>
+            <a:ext cx="14493758" cy="1200329"/>
           </a:xfrm>
-        </p:grpSpPr>
-        <p:sp>
-          <p:nvSpPr>
-            <p:cNvPr id="2" name="Rectangle 1">
-              <a:extLst>
-                <a:ext uri="{FF2B5EF4-FFF2-40B4-BE49-F238E27FC236}">
-                  <a16:creationId xmlns:a16="http://schemas.microsoft.com/office/drawing/2014/main" id="{856039CA-5AAE-4DB2-8D06-4461CC09BA92}"/>
-                </a:ext>
-              </a:extLst>
-            </p:cNvPr>
-            <p:cNvSpPr/>
-            <p:nvPr/>
-          </p:nvSpPr>
-          <p:spPr>
-            <a:xfrm>
-              <a:off x="15341730" y="12039900"/>
-              <a:ext cx="13893924" cy="5287980"/>
-            </a:xfrm>
-            <a:prstGeom prst="rect">
-              <a:avLst/>
-            </a:prstGeom>
-            <a:solidFill>
-              <a:schemeClr val="accent3">
-                <a:lumMod val="20000"/>
-                <a:lumOff val="80000"/>
-              </a:schemeClr>
-            </a:solidFill>
-            <a:ln w="19050">
-              <a:solidFill>
-                <a:schemeClr val="accent1"/>
-              </a:solidFill>
-            </a:ln>
-          </p:spPr>
-          <p:style>
-            <a:lnRef idx="2">
-              <a:schemeClr val="accent1">
-                <a:shade val="50000"/>
-              </a:schemeClr>
-            </a:lnRef>
-            <a:fillRef idx="1">
-              <a:schemeClr val="accent1"/>
-            </a:fillRef>
-            <a:effectRef idx="0">
-              <a:schemeClr val="accent1"/>
-            </a:effectRef>
-            <a:fontRef idx="minor">
-              <a:schemeClr val="lt1"/>
-            </a:fontRef>
-          </p:style>
-          <p:txBody>
-            <a:bodyPr rtlCol="0" anchor="ctr"/>
-            <a:lstStyle/>
-            <a:p>
-              <a:pPr algn="ctr"/>
-              <a:endParaRPr lang="en-US" dirty="0"/>
-            </a:p>
-          </p:txBody>
-        </p:sp>
-        <p:sp>
-          <p:nvSpPr>
-            <p:cNvPr id="5" name="TextBox 4">
-              <a:extLst>
-                <a:ext uri="{FF2B5EF4-FFF2-40B4-BE49-F238E27FC236}">
-                  <a16:creationId xmlns:a16="http://schemas.microsoft.com/office/drawing/2014/main" id="{5F8FB4C6-70E7-4A28-93C7-CBD25973477A}"/>
-                </a:ext>
-              </a:extLst>
-            </p:cNvPr>
-            <p:cNvSpPr txBox="1"/>
-            <p:nvPr/>
-          </p:nvSpPr>
-          <p:spPr>
-            <a:xfrm>
-              <a:off x="16154400" y="12755880"/>
-              <a:ext cx="2788920" cy="3108543"/>
-            </a:xfrm>
-            <a:prstGeom prst="rect">
-              <a:avLst/>
-            </a:prstGeom>
+          <a:prstGeom prst="rect">
+            <a:avLst/>
+          </a:prstGeom>
+          <a:noFill/>
+          <a:ln w="25400">
             <a:noFill/>
-            <a:ln w="25400">
-              <a:solidFill>
-                <a:schemeClr val="accent1">
-                  <a:shade val="50000"/>
-                </a:schemeClr>
-              </a:solidFill>
-            </a:ln>
-          </p:spPr>
-          <p:txBody>
-            <a:bodyPr wrap="square" rtlCol="0">
-              <a:spAutoFit/>
-            </a:bodyPr>
-            <a:lstStyle/>
-            <a:p>
-              <a:r>
-                <a:rPr lang="en-US" sz="2800" dirty="0" err="1"/>
-                <a:t>fc_stations</a:t>
-              </a:r>
-              <a:endParaRPr lang="en-US" sz="2800" dirty="0"/>
-            </a:p>
-            <a:p>
-              <a:r>
-                <a:rPr lang="en-US" sz="2800" dirty="0"/>
-                <a:t>----------------------</a:t>
-              </a:r>
-            </a:p>
-            <a:p>
-              <a:r>
-                <a:rPr lang="en-US" sz="2800" dirty="0" err="1"/>
-                <a:t>StationName</a:t>
-              </a:r>
-              <a:r>
-                <a:rPr lang="en-US" sz="2800" dirty="0"/>
-                <a:t> (</a:t>
-              </a:r>
-              <a:r>
-                <a:rPr lang="en-US" sz="2800" dirty="0" err="1"/>
-                <a:t>pk</a:t>
-              </a:r>
-              <a:r>
-                <a:rPr lang="en-US" sz="2800" dirty="0"/>
-                <a:t>)</a:t>
-              </a:r>
-            </a:p>
-            <a:p>
-              <a:r>
-                <a:rPr lang="en-US" sz="2800" dirty="0"/>
-                <a:t>Lat</a:t>
-              </a:r>
-            </a:p>
-            <a:p>
-              <a:r>
-                <a:rPr lang="en-US" sz="2800" dirty="0"/>
-                <a:t>Long</a:t>
-              </a:r>
-            </a:p>
-            <a:p>
-              <a:r>
-                <a:rPr lang="en-US" sz="2800" dirty="0" err="1"/>
-                <a:t>projectName</a:t>
-              </a:r>
-              <a:endParaRPr lang="en-US" sz="2800" dirty="0"/>
-            </a:p>
-            <a:p>
-              <a:r>
-                <a:rPr lang="en-US" sz="2800" dirty="0" err="1"/>
-                <a:t>waterDepth</a:t>
-              </a:r>
-              <a:endParaRPr lang="en-US" sz="2800" dirty="0"/>
-            </a:p>
-          </p:txBody>
-        </p:sp>
-        <p:sp>
-          <p:nvSpPr>
-            <p:cNvPr id="19" name="TextBox 18">
-              <a:extLst>
-                <a:ext uri="{FF2B5EF4-FFF2-40B4-BE49-F238E27FC236}">
-                  <a16:creationId xmlns:a16="http://schemas.microsoft.com/office/drawing/2014/main" id="{7BA4A1CC-FE8E-4744-8106-6A1C26A893D6}"/>
-                </a:ext>
-              </a:extLst>
-            </p:cNvPr>
-            <p:cNvSpPr txBox="1"/>
-            <p:nvPr/>
-          </p:nvSpPr>
-          <p:spPr>
-            <a:xfrm>
-              <a:off x="21122640" y="12755880"/>
-              <a:ext cx="2788920" cy="3970318"/>
-            </a:xfrm>
-            <a:prstGeom prst="rect">
-              <a:avLst/>
-            </a:prstGeom>
-            <a:noFill/>
-            <a:ln w="25400">
-              <a:solidFill>
-                <a:schemeClr val="accent1">
-                  <a:shade val="50000"/>
-                </a:schemeClr>
-              </a:solidFill>
-            </a:ln>
-          </p:spPr>
-          <p:txBody>
-            <a:bodyPr wrap="square" rtlCol="0">
-              <a:spAutoFit/>
-            </a:bodyPr>
-            <a:lstStyle/>
-            <a:p>
-              <a:r>
-                <a:rPr lang="en-US" sz="2800" dirty="0" err="1"/>
-                <a:t>tbl_gages</a:t>
-              </a:r>
-              <a:endParaRPr lang="en-US" sz="2800" dirty="0"/>
-            </a:p>
-            <a:p>
-              <a:r>
-                <a:rPr lang="en-US" sz="2800" dirty="0"/>
-                <a:t>----------------------</a:t>
-              </a:r>
-            </a:p>
-            <a:p>
-              <a:r>
-                <a:rPr lang="en-US" sz="2800" dirty="0" err="1"/>
-                <a:t>gageId</a:t>
-              </a:r>
-              <a:r>
-                <a:rPr lang="en-US" sz="2800" dirty="0"/>
-                <a:t> (</a:t>
-              </a:r>
-              <a:r>
-                <a:rPr lang="en-US" sz="2800" dirty="0" err="1"/>
-                <a:t>pk</a:t>
-              </a:r>
-              <a:r>
-                <a:rPr lang="en-US" sz="2800" dirty="0"/>
-                <a:t>)</a:t>
-              </a:r>
-            </a:p>
-            <a:p>
-              <a:r>
-                <a:rPr lang="en-US" sz="2800" dirty="0" err="1"/>
-                <a:t>gageModelName</a:t>
-              </a:r>
-              <a:endParaRPr lang="en-US" sz="2800" dirty="0"/>
-            </a:p>
-            <a:p>
-              <a:r>
-                <a:rPr lang="en-US" sz="2800" dirty="0" err="1"/>
-                <a:t>StationName</a:t>
-              </a:r>
-              <a:r>
-                <a:rPr lang="en-US" sz="2800" dirty="0"/>
-                <a:t> (</a:t>
-              </a:r>
-              <a:r>
-                <a:rPr lang="en-US" sz="2800" dirty="0" err="1"/>
-                <a:t>fk</a:t>
-              </a:r>
-              <a:r>
-                <a:rPr lang="en-US" sz="2800" dirty="0"/>
-                <a:t>)</a:t>
-              </a:r>
-            </a:p>
-            <a:p>
-              <a:r>
-                <a:rPr lang="en-US" sz="2800" dirty="0"/>
-                <a:t>assigned</a:t>
-              </a:r>
-            </a:p>
-            <a:p>
-              <a:r>
-                <a:rPr lang="en-US" sz="2800" dirty="0"/>
-                <a:t>comments</a:t>
-              </a:r>
-            </a:p>
-            <a:p>
-              <a:r>
-                <a:rPr lang="en-US" sz="2800" dirty="0" err="1"/>
-                <a:t>createdAt</a:t>
-              </a:r>
-              <a:endParaRPr lang="en-US" sz="2800" dirty="0"/>
-            </a:p>
-            <a:p>
-              <a:r>
-                <a:rPr lang="en-US" sz="2800" dirty="0"/>
-                <a:t>title</a:t>
-              </a:r>
-            </a:p>
-          </p:txBody>
-        </p:sp>
-        <p:sp>
-          <p:nvSpPr>
-            <p:cNvPr id="20" name="TextBox 19">
-              <a:extLst>
-                <a:ext uri="{FF2B5EF4-FFF2-40B4-BE49-F238E27FC236}">
-                  <a16:creationId xmlns:a16="http://schemas.microsoft.com/office/drawing/2014/main" id="{6FA5D98D-65B3-4993-9633-B1F1156163EB}"/>
-                </a:ext>
-              </a:extLst>
-            </p:cNvPr>
-            <p:cNvSpPr txBox="1"/>
-            <p:nvPr/>
-          </p:nvSpPr>
-          <p:spPr>
-            <a:xfrm>
-              <a:off x="25953720" y="12755880"/>
-              <a:ext cx="2392680" cy="3970318"/>
-            </a:xfrm>
-            <a:prstGeom prst="rect">
-              <a:avLst/>
-            </a:prstGeom>
-            <a:noFill/>
-            <a:ln w="25400">
-              <a:solidFill>
-                <a:schemeClr val="accent1">
-                  <a:shade val="50000"/>
-                </a:schemeClr>
-              </a:solidFill>
-            </a:ln>
-          </p:spPr>
-          <p:txBody>
-            <a:bodyPr wrap="square" rtlCol="0">
-              <a:spAutoFit/>
-            </a:bodyPr>
-            <a:lstStyle/>
-            <a:p>
-              <a:r>
-                <a:rPr lang="en-US" sz="2800" dirty="0" err="1"/>
-                <a:t>tbl_statuses</a:t>
-              </a:r>
-              <a:endParaRPr lang="en-US" sz="2800" dirty="0"/>
-            </a:p>
-            <a:p>
-              <a:r>
-                <a:rPr lang="en-US" sz="2800" dirty="0"/>
-                <a:t>------------------</a:t>
-              </a:r>
-            </a:p>
-            <a:p>
-              <a:r>
-                <a:rPr lang="en-US" sz="2800" dirty="0" err="1"/>
-                <a:t>statusId</a:t>
-              </a:r>
-              <a:r>
-                <a:rPr lang="en-US" sz="2800" dirty="0"/>
-                <a:t> (</a:t>
-              </a:r>
-              <a:r>
-                <a:rPr lang="en-US" sz="2800" dirty="0" err="1"/>
-                <a:t>pk</a:t>
-              </a:r>
-              <a:r>
-                <a:rPr lang="en-US" sz="2800" dirty="0"/>
-                <a:t>)</a:t>
-              </a:r>
-            </a:p>
-            <a:p>
-              <a:r>
-                <a:rPr lang="en-US" sz="2800" dirty="0" err="1"/>
-                <a:t>gageId</a:t>
-              </a:r>
-              <a:r>
-                <a:rPr lang="en-US" sz="2800" dirty="0"/>
-                <a:t> (</a:t>
-              </a:r>
-              <a:r>
-                <a:rPr lang="en-US" sz="2800" dirty="0" err="1"/>
-                <a:t>fk</a:t>
-              </a:r>
-              <a:r>
-                <a:rPr lang="en-US" sz="2800" dirty="0"/>
-                <a:t>)</a:t>
-              </a:r>
-            </a:p>
-            <a:p>
-              <a:r>
-                <a:rPr lang="en-US" sz="2800" dirty="0"/>
-                <a:t>status</a:t>
-              </a:r>
-            </a:p>
-            <a:p>
-              <a:r>
-                <a:rPr lang="en-US" sz="2800" dirty="0" err="1"/>
-                <a:t>startTime</a:t>
-              </a:r>
-              <a:endParaRPr lang="en-US" sz="2800" dirty="0"/>
-            </a:p>
-            <a:p>
-              <a:r>
-                <a:rPr lang="en-US" sz="2800" dirty="0" err="1"/>
-                <a:t>endTime</a:t>
-              </a:r>
-              <a:endParaRPr lang="en-US" sz="2800" dirty="0"/>
-            </a:p>
-            <a:p>
-              <a:r>
-                <a:rPr lang="en-US" sz="2800" dirty="0" err="1"/>
-                <a:t>updatedAt</a:t>
-              </a:r>
-              <a:endParaRPr lang="en-US" sz="2800" dirty="0"/>
-            </a:p>
-            <a:p>
-              <a:r>
-                <a:rPr lang="en-US" sz="2800" dirty="0" err="1"/>
-                <a:t>updatedBy</a:t>
-              </a:r>
-              <a:endParaRPr lang="en-US" sz="2800" dirty="0"/>
-            </a:p>
-          </p:txBody>
-        </p:sp>
-        <p:grpSp>
-          <p:nvGrpSpPr>
-            <p:cNvPr id="27" name="Group 26">
-              <a:extLst>
-                <a:ext uri="{FF2B5EF4-FFF2-40B4-BE49-F238E27FC236}">
-                  <a16:creationId xmlns:a16="http://schemas.microsoft.com/office/drawing/2014/main" id="{74BFC360-BDAB-4269-99D9-A17C501E38E1}"/>
-                </a:ext>
-              </a:extLst>
-            </p:cNvPr>
-            <p:cNvGrpSpPr/>
-            <p:nvPr/>
-          </p:nvGrpSpPr>
-          <p:grpSpPr>
-            <a:xfrm>
-              <a:off x="19126200" y="13436620"/>
-              <a:ext cx="1798320" cy="1440001"/>
-              <a:chOff x="19126200" y="13436620"/>
-              <a:chExt cx="1798320" cy="1440001"/>
-            </a:xfrm>
-          </p:grpSpPr>
-          <p:cxnSp>
-            <p:nvCxnSpPr>
-              <p:cNvPr id="21" name="Connector: Elbow 20">
-                <a:extLst>
-                  <a:ext uri="{FF2B5EF4-FFF2-40B4-BE49-F238E27FC236}">
-                    <a16:creationId xmlns:a16="http://schemas.microsoft.com/office/drawing/2014/main" id="{CCB4FB8E-A868-4804-B392-7D14F58B14B5}"/>
-                  </a:ext>
-                </a:extLst>
-              </p:cNvPr>
-              <p:cNvCxnSpPr>
-                <a:cxnSpLocks/>
-              </p:cNvCxnSpPr>
-              <p:nvPr/>
-            </p:nvCxnSpPr>
-            <p:spPr>
-              <a:xfrm>
-                <a:off x="19126200" y="13959840"/>
-                <a:ext cx="1798320" cy="769441"/>
-              </a:xfrm>
-              <a:prstGeom prst="bentConnector3">
-                <a:avLst>
-                  <a:gd name="adj1" fmla="val 50000"/>
-                </a:avLst>
-              </a:prstGeom>
-              <a:ln w="38100">
-                <a:solidFill>
-                  <a:schemeClr val="accent2">
-                    <a:lumMod val="50000"/>
-                  </a:schemeClr>
-                </a:solidFill>
-              </a:ln>
-            </p:spPr>
-            <p:style>
-              <a:lnRef idx="1">
-                <a:schemeClr val="accent1"/>
-              </a:lnRef>
-              <a:fillRef idx="0">
-                <a:schemeClr val="accent1"/>
-              </a:fillRef>
-              <a:effectRef idx="0">
-                <a:schemeClr val="accent1"/>
-              </a:effectRef>
-              <a:fontRef idx="minor">
-                <a:schemeClr val="tx1"/>
-              </a:fontRef>
-            </p:style>
-          </p:cxnSp>
-          <p:sp>
-            <p:nvSpPr>
-              <p:cNvPr id="24" name="TextBox 23">
-                <a:extLst>
-                  <a:ext uri="{FF2B5EF4-FFF2-40B4-BE49-F238E27FC236}">
-                    <a16:creationId xmlns:a16="http://schemas.microsoft.com/office/drawing/2014/main" id="{0A6B986A-498F-4041-8614-B562E81FA6A7}"/>
-                  </a:ext>
-                </a:extLst>
-              </p:cNvPr>
-              <p:cNvSpPr txBox="1"/>
-              <p:nvPr/>
-            </p:nvSpPr>
-            <p:spPr>
-              <a:xfrm>
-                <a:off x="19194780" y="13436620"/>
-                <a:ext cx="411480" cy="523220"/>
-              </a:xfrm>
-              <a:prstGeom prst="rect">
-                <a:avLst/>
-              </a:prstGeom>
-              <a:noFill/>
-              <a:ln w="25400">
-                <a:noFill/>
-              </a:ln>
-            </p:spPr>
-            <p:txBody>
-              <a:bodyPr wrap="square" rtlCol="0">
-                <a:spAutoFit/>
-              </a:bodyPr>
-              <a:lstStyle/>
-              <a:p>
-                <a:r>
-                  <a:rPr lang="en-US" sz="2800" dirty="0"/>
-                  <a:t>1</a:t>
-                </a:r>
-              </a:p>
-            </p:txBody>
-          </p:sp>
-          <p:sp>
-            <p:nvSpPr>
-              <p:cNvPr id="25" name="TextBox 24">
-                <a:extLst>
-                  <a:ext uri="{FF2B5EF4-FFF2-40B4-BE49-F238E27FC236}">
-                    <a16:creationId xmlns:a16="http://schemas.microsoft.com/office/drawing/2014/main" id="{34B62B20-0939-4252-A2FC-E75FD5A81B56}"/>
-                  </a:ext>
-                </a:extLst>
-              </p:cNvPr>
-              <p:cNvSpPr txBox="1"/>
-              <p:nvPr/>
-            </p:nvSpPr>
-            <p:spPr>
-              <a:xfrm>
-                <a:off x="20139660" y="14107180"/>
-                <a:ext cx="723900" cy="769441"/>
-              </a:xfrm>
-              <a:prstGeom prst="rect">
-                <a:avLst/>
-              </a:prstGeom>
-              <a:noFill/>
-              <a:ln w="25400">
-                <a:noFill/>
-              </a:ln>
-            </p:spPr>
-            <p:txBody>
-              <a:bodyPr wrap="square" rtlCol="0">
-                <a:spAutoFit/>
-              </a:bodyPr>
-              <a:lstStyle/>
-              <a:p>
-                <a:r>
-                  <a:rPr lang="en-US" sz="4400" dirty="0"/>
-                  <a:t>∞</a:t>
-                </a:r>
-              </a:p>
-            </p:txBody>
-          </p:sp>
-        </p:grpSp>
-        <p:grpSp>
-          <p:nvGrpSpPr>
-            <p:cNvPr id="33" name="Group 32">
-              <a:extLst>
-                <a:ext uri="{FF2B5EF4-FFF2-40B4-BE49-F238E27FC236}">
-                  <a16:creationId xmlns:a16="http://schemas.microsoft.com/office/drawing/2014/main" id="{6BCA7339-FE58-41A4-880D-6A598D18B8B1}"/>
-                </a:ext>
-              </a:extLst>
-            </p:cNvPr>
-            <p:cNvGrpSpPr/>
-            <p:nvPr/>
-          </p:nvGrpSpPr>
-          <p:grpSpPr>
-            <a:xfrm>
-              <a:off x="24018240" y="13345180"/>
-              <a:ext cx="1874520" cy="1226641"/>
-              <a:chOff x="24079200" y="13345180"/>
-              <a:chExt cx="1874520" cy="1226641"/>
-            </a:xfrm>
-          </p:grpSpPr>
-          <p:cxnSp>
-            <p:nvCxnSpPr>
-              <p:cNvPr id="29" name="Connector: Elbow 28">
-                <a:extLst>
-                  <a:ext uri="{FF2B5EF4-FFF2-40B4-BE49-F238E27FC236}">
-                    <a16:creationId xmlns:a16="http://schemas.microsoft.com/office/drawing/2014/main" id="{7792F591-5D87-446E-985B-806F6FE98D0D}"/>
-                  </a:ext>
-                </a:extLst>
-              </p:cNvPr>
-              <p:cNvCxnSpPr>
-                <a:cxnSpLocks/>
-              </p:cNvCxnSpPr>
-              <p:nvPr/>
-            </p:nvCxnSpPr>
-            <p:spPr>
-              <a:xfrm>
-                <a:off x="24079200" y="13868400"/>
-                <a:ext cx="1874520" cy="509020"/>
-              </a:xfrm>
-              <a:prstGeom prst="bentConnector3">
-                <a:avLst>
-                  <a:gd name="adj1" fmla="val 50000"/>
-                </a:avLst>
-              </a:prstGeom>
-              <a:ln w="38100">
-                <a:solidFill>
-                  <a:schemeClr val="accent2">
-                    <a:lumMod val="50000"/>
-                  </a:schemeClr>
-                </a:solidFill>
-              </a:ln>
-            </p:spPr>
-            <p:style>
-              <a:lnRef idx="1">
-                <a:schemeClr val="accent1"/>
-              </a:lnRef>
-              <a:fillRef idx="0">
-                <a:schemeClr val="accent1"/>
-              </a:fillRef>
-              <a:effectRef idx="0">
-                <a:schemeClr val="accent1"/>
-              </a:effectRef>
-              <a:fontRef idx="minor">
-                <a:schemeClr val="tx1"/>
-              </a:fontRef>
-            </p:style>
-          </p:cxnSp>
-          <p:sp>
-            <p:nvSpPr>
-              <p:cNvPr id="30" name="TextBox 29">
-                <a:extLst>
-                  <a:ext uri="{FF2B5EF4-FFF2-40B4-BE49-F238E27FC236}">
-                    <a16:creationId xmlns:a16="http://schemas.microsoft.com/office/drawing/2014/main" id="{50F79FA3-F53E-4A87-9805-B59D9460AE87}"/>
-                  </a:ext>
-                </a:extLst>
-              </p:cNvPr>
-              <p:cNvSpPr txBox="1"/>
-              <p:nvPr/>
-            </p:nvSpPr>
-            <p:spPr>
-              <a:xfrm>
-                <a:off x="24147780" y="13345180"/>
-                <a:ext cx="411480" cy="523220"/>
-              </a:xfrm>
-              <a:prstGeom prst="rect">
-                <a:avLst/>
-              </a:prstGeom>
-              <a:noFill/>
-              <a:ln w="25400">
-                <a:noFill/>
-              </a:ln>
-            </p:spPr>
-            <p:txBody>
-              <a:bodyPr wrap="square" rtlCol="0">
-                <a:spAutoFit/>
-              </a:bodyPr>
-              <a:lstStyle/>
-              <a:p>
-                <a:r>
-                  <a:rPr lang="en-US" sz="2800" dirty="0"/>
-                  <a:t>1</a:t>
-                </a:r>
-              </a:p>
-            </p:txBody>
-          </p:sp>
-          <p:sp>
-            <p:nvSpPr>
-              <p:cNvPr id="31" name="TextBox 30">
-                <a:extLst>
-                  <a:ext uri="{FF2B5EF4-FFF2-40B4-BE49-F238E27FC236}">
-                    <a16:creationId xmlns:a16="http://schemas.microsoft.com/office/drawing/2014/main" id="{3F87D48B-BB8C-46DA-A8E5-309C4C97D04D}"/>
-                  </a:ext>
-                </a:extLst>
-              </p:cNvPr>
-              <p:cNvSpPr txBox="1"/>
-              <p:nvPr/>
-            </p:nvSpPr>
-            <p:spPr>
-              <a:xfrm>
-                <a:off x="25138380" y="13802380"/>
-                <a:ext cx="723900" cy="769441"/>
-              </a:xfrm>
-              <a:prstGeom prst="rect">
-                <a:avLst/>
-              </a:prstGeom>
-              <a:noFill/>
-              <a:ln w="25400">
-                <a:noFill/>
-              </a:ln>
-            </p:spPr>
-            <p:txBody>
-              <a:bodyPr wrap="square" rtlCol="0">
-                <a:spAutoFit/>
-              </a:bodyPr>
-              <a:lstStyle/>
-              <a:p>
-                <a:r>
-                  <a:rPr lang="en-US" sz="4400" dirty="0"/>
-                  <a:t>∞</a:t>
-                </a:r>
-              </a:p>
-            </p:txBody>
-          </p:sp>
-        </p:grpSp>
-        <p:sp>
-          <p:nvSpPr>
-            <p:cNvPr id="34" name="TextBox 33">
-              <a:extLst>
-                <a:ext uri="{FF2B5EF4-FFF2-40B4-BE49-F238E27FC236}">
-                  <a16:creationId xmlns:a16="http://schemas.microsoft.com/office/drawing/2014/main" id="{F5BA52F6-4509-4B99-A0EB-28451D46D307}"/>
-                </a:ext>
-              </a:extLst>
-            </p:cNvPr>
-            <p:cNvSpPr txBox="1"/>
-            <p:nvPr/>
-          </p:nvSpPr>
-          <p:spPr>
-            <a:xfrm>
-              <a:off x="15048396" y="17293510"/>
-              <a:ext cx="14493758" cy="1200329"/>
-            </a:xfrm>
-            <a:prstGeom prst="rect">
-              <a:avLst/>
-            </a:prstGeom>
-            <a:noFill/>
-            <a:ln w="25400">
-              <a:noFill/>
-            </a:ln>
-          </p:spPr>
-          <p:txBody>
-            <a:bodyPr wrap="square" rtlCol="0">
-              <a:spAutoFit/>
-            </a:bodyPr>
-            <a:lstStyle/>
-            <a:p>
-              <a:r>
-                <a:rPr lang="en-US" sz="3600" dirty="0"/>
-                <a:t>Diagram 1: Entity Relation Diagram for the RDMBS implementation of the database.</a:t>
-              </a:r>
-            </a:p>
-          </p:txBody>
-        </p:sp>
-      </p:grpSp>
+          </a:ln>
+        </p:spPr>
+        <p:txBody>
+          <a:bodyPr wrap="square" rtlCol="0">
+            <a:spAutoFit/>
+          </a:bodyPr>
+          <a:lstStyle/>
+          <a:p>
+            <a:r>
+              <a:rPr lang="en-US" sz="3600" dirty="0"/>
+              <a:t>Diagram 1: Entity Relation Diagram for the RDMBS implementation of the database.</a:t>
+            </a:r>
+          </a:p>
+        </p:txBody>
+      </p:sp>
       <p:grpSp>
         <p:nvGrpSpPr>
           <p:cNvPr id="39" name="Group 38">
@@ -4542,10 +3795,10 @@
       </p:grpSp>
       <p:grpSp>
         <p:nvGrpSpPr>
-          <p:cNvPr id="38" name="Group 37">
+          <p:cNvPr id="26" name="Group 25">
             <a:extLst>
               <a:ext uri="{FF2B5EF4-FFF2-40B4-BE49-F238E27FC236}">
-                <a16:creationId xmlns:a16="http://schemas.microsoft.com/office/drawing/2014/main" id="{CFB73875-7A2A-449D-8F30-A339883B100D}"/>
+                <a16:creationId xmlns:a16="http://schemas.microsoft.com/office/drawing/2014/main" id="{B5183365-1EAE-4053-ABB3-4EBEF552FBF1}"/>
               </a:ext>
             </a:extLst>
           </p:cNvPr>
@@ -4554,53 +3807,75 @@
         </p:nvGrpSpPr>
         <p:grpSpPr>
           <a:xfrm>
-            <a:off x="30308531" y="4914903"/>
-            <a:ext cx="12505314" cy="16456211"/>
-            <a:chOff x="30308531" y="4914903"/>
-            <a:chExt cx="12505314" cy="16456211"/>
+            <a:off x="15341730" y="12039900"/>
+            <a:ext cx="13893924" cy="5287980"/>
+            <a:chOff x="15341730" y="12039900"/>
+            <a:chExt cx="13893924" cy="5287980"/>
           </a:xfrm>
         </p:grpSpPr>
-        <p:pic>
-          <p:nvPicPr>
-            <p:cNvPr id="10" name="Picture 9">
+        <p:sp>
+          <p:nvSpPr>
+            <p:cNvPr id="2" name="Rectangle 1">
               <a:extLst>
                 <a:ext uri="{FF2B5EF4-FFF2-40B4-BE49-F238E27FC236}">
-                  <a16:creationId xmlns:a16="http://schemas.microsoft.com/office/drawing/2014/main" id="{33DF940B-164A-4D1B-8EB8-35D255C55077}"/>
+                  <a16:creationId xmlns:a16="http://schemas.microsoft.com/office/drawing/2014/main" id="{856039CA-5AAE-4DB2-8D06-4461CC09BA92}"/>
                 </a:ext>
               </a:extLst>
             </p:cNvPr>
-            <p:cNvPicPr>
-              <a:picLocks noChangeAspect="1"/>
-            </p:cNvPicPr>
+            <p:cNvSpPr/>
             <p:nvPr/>
-          </p:nvPicPr>
-          <p:blipFill rotWithShape="1">
-            <a:blip r:embed="rId5">
-              <a:extLst>
-                <a:ext uri="{28A0092B-C50C-407E-A947-70E740481C1C}">
-                  <a14:useLocalDpi xmlns:a14="http://schemas.microsoft.com/office/drawing/2010/main" val="0"/>
-                </a:ext>
-              </a:extLst>
-            </a:blip>
-            <a:srcRect l="4158" r="4979"/>
-            <a:stretch/>
-          </p:blipFill>
+          </p:nvSpPr>
           <p:spPr>
-            <a:xfrm rot="5400000">
-              <a:off x="28991052" y="6236859"/>
-              <a:ext cx="15144750" cy="12500837"/>
+            <a:xfrm>
+              <a:off x="15341730" y="12039900"/>
+              <a:ext cx="13893924" cy="5287980"/>
             </a:xfrm>
             <a:prstGeom prst="rect">
               <a:avLst/>
             </a:prstGeom>
+            <a:solidFill>
+              <a:schemeClr val="accent3">
+                <a:lumMod val="20000"/>
+                <a:lumOff val="80000"/>
+              </a:schemeClr>
+            </a:solidFill>
+            <a:ln w="19050">
+              <a:solidFill>
+                <a:schemeClr val="accent1"/>
+              </a:solidFill>
+            </a:ln>
           </p:spPr>
-        </p:pic>
+          <p:style>
+            <a:lnRef idx="2">
+              <a:schemeClr val="accent1">
+                <a:shade val="50000"/>
+              </a:schemeClr>
+            </a:lnRef>
+            <a:fillRef idx="1">
+              <a:schemeClr val="accent1"/>
+            </a:fillRef>
+            <a:effectRef idx="0">
+              <a:schemeClr val="accent1"/>
+            </a:effectRef>
+            <a:fontRef idx="minor">
+              <a:schemeClr val="lt1"/>
+            </a:fontRef>
+          </p:style>
+          <p:txBody>
+            <a:bodyPr rtlCol="0" anchor="ctr"/>
+            <a:lstStyle/>
+            <a:p>
+              <a:pPr algn="ctr"/>
+              <a:endParaRPr lang="en-US" dirty="0"/>
+            </a:p>
+          </p:txBody>
+        </p:sp>
         <p:sp>
           <p:nvSpPr>
-            <p:cNvPr id="37" name="TextBox 36">
+            <p:cNvPr id="5" name="TextBox 4">
               <a:extLst>
                 <a:ext uri="{FF2B5EF4-FFF2-40B4-BE49-F238E27FC236}">
-                  <a16:creationId xmlns:a16="http://schemas.microsoft.com/office/drawing/2014/main" id="{95AECD71-D787-4DB2-880C-3A48C8303EAC}"/>
+                  <a16:creationId xmlns:a16="http://schemas.microsoft.com/office/drawing/2014/main" id="{5F8FB4C6-70E7-4A28-93C7-CBD25973477A}"/>
                 </a:ext>
               </a:extLst>
             </p:cNvPr>
@@ -4609,15 +3884,19 @@
           </p:nvSpPr>
           <p:spPr>
             <a:xfrm>
-              <a:off x="30308531" y="20170785"/>
-              <a:ext cx="12500838" cy="1200329"/>
+              <a:off x="17611725" y="12755880"/>
+              <a:ext cx="2788920" cy="3539430"/>
             </a:xfrm>
             <a:prstGeom prst="rect">
               <a:avLst/>
             </a:prstGeom>
             <a:noFill/>
             <a:ln w="25400">
-              <a:noFill/>
+              <a:solidFill>
+                <a:schemeClr val="accent1">
+                  <a:shade val="50000"/>
+                </a:schemeClr>
+              </a:solidFill>
             </a:ln>
           </p:spPr>
           <p:txBody>
@@ -4627,13 +3906,404 @@
             <a:lstStyle/>
             <a:p>
               <a:r>
-                <a:rPr lang="en-US" sz="3600" dirty="0"/>
-                <a:t>Figure 2: Photograph of the a typical gage station in the Currituck Sound.</a:t>
+                <a:rPr lang="en-US" sz="2800" dirty="0" err="1"/>
+                <a:t>fc_stations</a:t>
+              </a:r>
+              <a:endParaRPr lang="en-US" sz="2800" dirty="0"/>
+            </a:p>
+            <a:p>
+              <a:r>
+                <a:rPr lang="en-US" sz="2800" dirty="0"/>
+                <a:t>-----------------------</a:t>
+              </a:r>
+            </a:p>
+            <a:p>
+              <a:r>
+                <a:rPr lang="en-US" sz="2800" dirty="0" err="1"/>
+                <a:t>mongo_id</a:t>
+              </a:r>
+              <a:r>
+                <a:rPr lang="en-US" sz="2800" dirty="0"/>
+                <a:t> (</a:t>
+              </a:r>
+              <a:r>
+                <a:rPr lang="en-US" sz="2800" dirty="0" err="1"/>
+                <a:t>pk</a:t>
+              </a:r>
+              <a:r>
+                <a:rPr lang="en-US" sz="2800" dirty="0"/>
+                <a:t>)</a:t>
+              </a:r>
+            </a:p>
+            <a:p>
+              <a:r>
+                <a:rPr lang="en-US" sz="2800" dirty="0" err="1"/>
+                <a:t>StationName</a:t>
+              </a:r>
+              <a:endParaRPr lang="en-US" sz="2800" dirty="0"/>
+            </a:p>
+            <a:p>
+              <a:r>
+                <a:rPr lang="en-US" sz="2800" dirty="0"/>
+                <a:t>Lat</a:t>
+              </a:r>
+            </a:p>
+            <a:p>
+              <a:r>
+                <a:rPr lang="en-US" sz="2800" dirty="0"/>
+                <a:t>Long</a:t>
+              </a:r>
+            </a:p>
+            <a:p>
+              <a:r>
+                <a:rPr lang="en-US" sz="2800" dirty="0" err="1"/>
+                <a:t>projectName</a:t>
+              </a:r>
+              <a:endParaRPr lang="en-US" sz="2800" dirty="0"/>
+            </a:p>
+            <a:p>
+              <a:r>
+                <a:rPr lang="en-US" sz="2800" dirty="0" err="1"/>
+                <a:t>waterDepth</a:t>
+              </a:r>
+              <a:endParaRPr lang="en-US" sz="2800" dirty="0"/>
+            </a:p>
+          </p:txBody>
+        </p:sp>
+        <p:sp>
+          <p:nvSpPr>
+            <p:cNvPr id="19" name="TextBox 18">
+              <a:extLst>
+                <a:ext uri="{FF2B5EF4-FFF2-40B4-BE49-F238E27FC236}">
+                  <a16:creationId xmlns:a16="http://schemas.microsoft.com/office/drawing/2014/main" id="{7BA4A1CC-FE8E-4744-8106-6A1C26A893D6}"/>
+                </a:ext>
+              </a:extLst>
+            </p:cNvPr>
+            <p:cNvSpPr txBox="1"/>
+            <p:nvPr/>
+          </p:nvSpPr>
+          <p:spPr>
+            <a:xfrm>
+              <a:off x="23980140" y="12755880"/>
+              <a:ext cx="2788920" cy="3970318"/>
+            </a:xfrm>
+            <a:prstGeom prst="rect">
+              <a:avLst/>
+            </a:prstGeom>
+            <a:noFill/>
+            <a:ln w="25400">
+              <a:solidFill>
+                <a:schemeClr val="accent1">
+                  <a:shade val="50000"/>
+                </a:schemeClr>
+              </a:solidFill>
+            </a:ln>
+          </p:spPr>
+          <p:txBody>
+            <a:bodyPr wrap="square" rtlCol="0">
+              <a:spAutoFit/>
+            </a:bodyPr>
+            <a:lstStyle/>
+            <a:p>
+              <a:r>
+                <a:rPr lang="en-US" sz="2800" dirty="0"/>
+                <a:t>fc_gages</a:t>
+              </a:r>
+            </a:p>
+            <a:p>
+              <a:r>
+                <a:rPr lang="en-US" sz="2800" dirty="0"/>
+                <a:t>----------------------</a:t>
+              </a:r>
+            </a:p>
+            <a:p>
+              <a:r>
+                <a:rPr lang="en-US" sz="2800" dirty="0" err="1"/>
+                <a:t>mongo_id</a:t>
+              </a:r>
+              <a:r>
+                <a:rPr lang="en-US" sz="2800" dirty="0"/>
+                <a:t> (</a:t>
+              </a:r>
+              <a:r>
+                <a:rPr lang="en-US" sz="2800" dirty="0" err="1"/>
+                <a:t>pk</a:t>
+              </a:r>
+              <a:r>
+                <a:rPr lang="en-US" sz="2800" dirty="0"/>
+                <a:t>)</a:t>
+              </a:r>
+            </a:p>
+            <a:p>
+              <a:r>
+                <a:rPr lang="en-US" sz="2800" dirty="0" err="1"/>
+                <a:t>gageModelName</a:t>
+              </a:r>
+              <a:endParaRPr lang="en-US" sz="2800" dirty="0"/>
+            </a:p>
+            <a:p>
+              <a:r>
+                <a:rPr lang="en-US" sz="2800" dirty="0" err="1"/>
+                <a:t>Station_id</a:t>
+              </a:r>
+              <a:r>
+                <a:rPr lang="en-US" sz="2800" dirty="0"/>
+                <a:t> (</a:t>
+              </a:r>
+              <a:r>
+                <a:rPr lang="en-US" sz="2800" dirty="0" err="1"/>
+                <a:t>fk</a:t>
+              </a:r>
+              <a:r>
+                <a:rPr lang="en-US" sz="2800" dirty="0"/>
+                <a:t>)</a:t>
+              </a:r>
+            </a:p>
+            <a:p>
+              <a:r>
+                <a:rPr lang="en-US" sz="2800" dirty="0"/>
+                <a:t>assigned</a:t>
+              </a:r>
+            </a:p>
+            <a:p>
+              <a:r>
+                <a:rPr lang="en-US" sz="2800" dirty="0"/>
+                <a:t>comments</a:t>
+              </a:r>
+            </a:p>
+            <a:p>
+              <a:r>
+                <a:rPr lang="en-US" sz="2800" dirty="0" err="1"/>
+                <a:t>createdAt</a:t>
+              </a:r>
+              <a:endParaRPr lang="en-US" sz="2800" dirty="0"/>
+            </a:p>
+            <a:p>
+              <a:r>
+                <a:rPr lang="en-US" sz="2800" dirty="0"/>
+                <a:t>title</a:t>
               </a:r>
             </a:p>
           </p:txBody>
         </p:sp>
+        <p:grpSp>
+          <p:nvGrpSpPr>
+            <p:cNvPr id="9" name="Group 8">
+              <a:extLst>
+                <a:ext uri="{FF2B5EF4-FFF2-40B4-BE49-F238E27FC236}">
+                  <a16:creationId xmlns:a16="http://schemas.microsoft.com/office/drawing/2014/main" id="{8BF474A0-344B-4CAF-A236-F1FAB8D5903D}"/>
+                </a:ext>
+              </a:extLst>
+            </p:cNvPr>
+            <p:cNvGrpSpPr/>
+            <p:nvPr/>
+          </p:nvGrpSpPr>
+          <p:grpSpPr>
+            <a:xfrm>
+              <a:off x="20560017" y="13482920"/>
+              <a:ext cx="3318555" cy="1488241"/>
+              <a:chOff x="20560017" y="13482920"/>
+              <a:chExt cx="3318555" cy="1488241"/>
+            </a:xfrm>
+          </p:grpSpPr>
+          <p:cxnSp>
+            <p:nvCxnSpPr>
+              <p:cNvPr id="21" name="Connector: Elbow 20">
+                <a:extLst>
+                  <a:ext uri="{FF2B5EF4-FFF2-40B4-BE49-F238E27FC236}">
+                    <a16:creationId xmlns:a16="http://schemas.microsoft.com/office/drawing/2014/main" id="{CCB4FB8E-A868-4804-B392-7D14F58B14B5}"/>
+                  </a:ext>
+                </a:extLst>
+              </p:cNvPr>
+              <p:cNvCxnSpPr>
+                <a:cxnSpLocks/>
+              </p:cNvCxnSpPr>
+              <p:nvPr/>
+            </p:nvCxnSpPr>
+            <p:spPr>
+              <a:xfrm>
+                <a:off x="20560017" y="13920092"/>
+                <a:ext cx="3318555" cy="843598"/>
+              </a:xfrm>
+              <a:prstGeom prst="bentConnector3">
+                <a:avLst>
+                  <a:gd name="adj1" fmla="val 50000"/>
+                </a:avLst>
+              </a:prstGeom>
+              <a:ln w="38100">
+                <a:solidFill>
+                  <a:schemeClr val="accent2">
+                    <a:lumMod val="50000"/>
+                  </a:schemeClr>
+                </a:solidFill>
+              </a:ln>
+            </p:spPr>
+            <p:style>
+              <a:lnRef idx="1">
+                <a:schemeClr val="accent1"/>
+              </a:lnRef>
+              <a:fillRef idx="0">
+                <a:schemeClr val="accent1"/>
+              </a:fillRef>
+              <a:effectRef idx="0">
+                <a:schemeClr val="accent1"/>
+              </a:effectRef>
+              <a:fontRef idx="minor">
+                <a:schemeClr val="tx1"/>
+              </a:fontRef>
+            </p:style>
+          </p:cxnSp>
+          <p:sp>
+            <p:nvSpPr>
+              <p:cNvPr id="24" name="TextBox 23">
+                <a:extLst>
+                  <a:ext uri="{FF2B5EF4-FFF2-40B4-BE49-F238E27FC236}">
+                    <a16:creationId xmlns:a16="http://schemas.microsoft.com/office/drawing/2014/main" id="{0A6B986A-498F-4041-8614-B562E81FA6A7}"/>
+                  </a:ext>
+                </a:extLst>
+              </p:cNvPr>
+              <p:cNvSpPr txBox="1"/>
+              <p:nvPr/>
+            </p:nvSpPr>
+            <p:spPr>
+              <a:xfrm>
+                <a:off x="20681766" y="13482920"/>
+                <a:ext cx="411480" cy="523220"/>
+              </a:xfrm>
+              <a:prstGeom prst="rect">
+                <a:avLst/>
+              </a:prstGeom>
+              <a:noFill/>
+              <a:ln w="25400">
+                <a:noFill/>
+              </a:ln>
+            </p:spPr>
+            <p:txBody>
+              <a:bodyPr wrap="square" rtlCol="0">
+                <a:spAutoFit/>
+              </a:bodyPr>
+              <a:lstStyle/>
+              <a:p>
+                <a:r>
+                  <a:rPr lang="en-US" sz="2800" dirty="0"/>
+                  <a:t>1</a:t>
+                </a:r>
+              </a:p>
+            </p:txBody>
+          </p:sp>
+          <p:sp>
+            <p:nvSpPr>
+              <p:cNvPr id="25" name="TextBox 24">
+                <a:extLst>
+                  <a:ext uri="{FF2B5EF4-FFF2-40B4-BE49-F238E27FC236}">
+                    <a16:creationId xmlns:a16="http://schemas.microsoft.com/office/drawing/2014/main" id="{34B62B20-0939-4252-A2FC-E75FD5A81B56}"/>
+                  </a:ext>
+                </a:extLst>
+              </p:cNvPr>
+              <p:cNvSpPr txBox="1"/>
+              <p:nvPr/>
+            </p:nvSpPr>
+            <p:spPr>
+              <a:xfrm>
+                <a:off x="22978299" y="14201720"/>
+                <a:ext cx="723900" cy="769441"/>
+              </a:xfrm>
+              <a:prstGeom prst="rect">
+                <a:avLst/>
+              </a:prstGeom>
+              <a:noFill/>
+              <a:ln w="25400">
+                <a:noFill/>
+              </a:ln>
+            </p:spPr>
+            <p:txBody>
+              <a:bodyPr wrap="square" rtlCol="0">
+                <a:spAutoFit/>
+              </a:bodyPr>
+              <a:lstStyle/>
+              <a:p>
+                <a:r>
+                  <a:rPr lang="en-US" sz="4400" dirty="0"/>
+                  <a:t>∞</a:t>
+                </a:r>
+              </a:p>
+            </p:txBody>
+          </p:sp>
+        </p:grpSp>
       </p:grpSp>
+      <p:pic>
+        <p:nvPicPr>
+          <p:cNvPr id="47" name="Picture 46" descr="FRF Sensors App - Google Chrome">
+            <a:extLst>
+              <a:ext uri="{FF2B5EF4-FFF2-40B4-BE49-F238E27FC236}">
+                <a16:creationId xmlns:a16="http://schemas.microsoft.com/office/drawing/2014/main" id="{BC19FCC0-6480-4C6A-A3AD-1879D1DA0E51}"/>
+              </a:ext>
+            </a:extLst>
+          </p:cNvPr>
+          <p:cNvPicPr>
+            <a:picLocks noChangeAspect="1"/>
+          </p:cNvPicPr>
+          <p:nvPr/>
+        </p:nvPicPr>
+        <p:blipFill rotWithShape="1">
+          <a:blip r:embed="rId5">
+            <a:extLst>
+              <a:ext uri="{28A0092B-C50C-407E-A947-70E740481C1C}">
+                <a14:useLocalDpi xmlns:a14="http://schemas.microsoft.com/office/drawing/2010/main" val="0"/>
+              </a:ext>
+            </a:extLst>
+          </a:blip>
+          <a:srcRect t="11628" r="24564"/>
+          <a:stretch/>
+        </p:blipFill>
+        <p:spPr>
+          <a:xfrm>
+            <a:off x="30462924" y="4929566"/>
+            <a:ext cx="11864640" cy="11108658"/>
+          </a:xfrm>
+          <a:prstGeom prst="rect">
+            <a:avLst/>
+          </a:prstGeom>
+        </p:spPr>
+      </p:pic>
+      <p:sp>
+        <p:nvSpPr>
+          <p:cNvPr id="48" name="TextBox 47">
+            <a:extLst>
+              <a:ext uri="{FF2B5EF4-FFF2-40B4-BE49-F238E27FC236}">
+                <a16:creationId xmlns:a16="http://schemas.microsoft.com/office/drawing/2014/main" id="{B176236A-F586-4498-B212-3A8D44A44E80}"/>
+              </a:ext>
+            </a:extLst>
+          </p:cNvPr>
+          <p:cNvSpPr txBox="1"/>
+          <p:nvPr/>
+        </p:nvSpPr>
+        <p:spPr>
+          <a:xfrm>
+            <a:off x="30445332" y="16375590"/>
+            <a:ext cx="11882231" cy="1754326"/>
+          </a:xfrm>
+          <a:prstGeom prst="rect">
+            <a:avLst/>
+          </a:prstGeom>
+          <a:noFill/>
+          <a:ln w="25400">
+            <a:noFill/>
+          </a:ln>
+        </p:spPr>
+        <p:txBody>
+          <a:bodyPr wrap="square" rtlCol="0">
+            <a:spAutoFit/>
+          </a:bodyPr>
+          <a:lstStyle/>
+          <a:p>
+            <a:r>
+              <a:rPr lang="en-US" sz="3600" dirty="0"/>
+              <a:t>Figure 2: Screen Capture of the Web Application showing stations and gages near the Field Research Facility Office in Duck, NC.</a:t>
+            </a:r>
+          </a:p>
+        </p:txBody>
+      </p:sp>
     </p:spTree>
     <p:extLst>
       <p:ext uri="{BB962C8B-B14F-4D97-AF65-F5344CB8AC3E}">

</xml_diff>